<commit_message>
added the final project
</commit_message>
<xml_diff>
--- a/labs ppts/Lab_6.pptx
+++ b/labs ppts/Lab_6.pptx
@@ -136,7 +136,7 @@
   </p:defaultTextStyle>
   <p:extLst>
     <p:ext uri="{EFAFB233-063F-42B5-8137-9DF3F51BA10A}">
-      <p15:sldGuideLst xmlns:p15="http://schemas.microsoft.com/office/powerpoint/2012/main" xmlns="">
+      <p15:sldGuideLst xmlns:p15="http://schemas.microsoft.com/office/powerpoint/2012/main">
         <p15:guide id="1" orient="horz" pos="2160">
           <p15:clr>
             <a:srgbClr val="A4A3A4"/>
@@ -235,7 +235,7 @@
           <a:p>
             <a:fld id="{E720CC18-8A65-498F-9239-94056B069C0A}" type="datetimeFigureOut">
               <a:rPr lang="en-US" smtClean="0"/>
-              <a:t>10/12/16</a:t>
+              <a:t>11/30/16</a:t>
             </a:fld>
             <a:endParaRPr lang="en-US"/>
           </a:p>
@@ -805,7 +805,7 @@
           <a:p>
             <a:fld id="{877DFCEC-30EC-4F4F-91D6-89C3BA70C62C}" type="datetime1">
               <a:rPr lang="en-US" altLang="zh-CN" smtClean="0"/>
-              <a:t>10/12/16</a:t>
+              <a:t>11/30/16</a:t>
             </a:fld>
             <a:endParaRPr lang="en-US"/>
           </a:p>
@@ -1118,7 +1118,7 @@
           <a:p>
             <a:fld id="{328F68DC-F4E2-1540-B60C-E4AE5E1252E5}" type="datetime1">
               <a:rPr lang="en-US" altLang="zh-CN" smtClean="0"/>
-              <a:t>10/12/16</a:t>
+              <a:t>11/30/16</a:t>
             </a:fld>
             <a:endParaRPr lang="en-US"/>
           </a:p>
@@ -1303,7 +1303,7 @@
           <a:p>
             <a:fld id="{7D7111F8-BA76-3F46-96BD-C2EFC6FC2227}" type="datetime1">
               <a:rPr lang="en-US" altLang="zh-CN" smtClean="0"/>
-              <a:t>10/12/16</a:t>
+              <a:t>11/30/16</a:t>
             </a:fld>
             <a:endParaRPr lang="en-US"/>
           </a:p>
@@ -1478,7 +1478,7 @@
           <a:p>
             <a:fld id="{1EAE8926-385C-5D4E-BBC2-6FE09A2A0418}" type="datetime1">
               <a:rPr lang="en-US" altLang="zh-CN" smtClean="0"/>
-              <a:t>10/12/16</a:t>
+              <a:t>11/30/16</a:t>
             </a:fld>
             <a:endParaRPr lang="en-US"/>
           </a:p>
@@ -1746,7 +1746,7 @@
           <a:p>
             <a:fld id="{14A6A2D0-361C-8C47-8248-4992A0F8C11E}" type="datetime1">
               <a:rPr lang="en-US" altLang="zh-CN" smtClean="0"/>
-              <a:t>10/12/16</a:t>
+              <a:t>11/30/16</a:t>
             </a:fld>
             <a:endParaRPr lang="en-US"/>
           </a:p>
@@ -2214,7 +2214,7 @@
           <a:p>
             <a:fld id="{F582A1B6-8813-BF4D-8B2C-4651E848DCD5}" type="datetime1">
               <a:rPr lang="en-US" altLang="zh-CN" smtClean="0"/>
-              <a:t>10/12/16</a:t>
+              <a:t>11/30/16</a:t>
             </a:fld>
             <a:endParaRPr lang="en-US"/>
           </a:p>
@@ -2703,7 +2703,7 @@
           <a:p>
             <a:fld id="{7F15B67A-EC62-094F-846A-F56BDBCE3780}" type="datetime1">
               <a:rPr lang="en-US" altLang="zh-CN" smtClean="0"/>
-              <a:t>10/12/16</a:t>
+              <a:t>11/30/16</a:t>
             </a:fld>
             <a:endParaRPr lang="en-US"/>
           </a:p>
@@ -2829,7 +2829,7 @@
           <a:p>
             <a:fld id="{387C3DD0-4C34-5C49-9F00-D31AA62426C3}" type="datetime1">
               <a:rPr lang="en-US" altLang="zh-CN" smtClean="0"/>
-              <a:t>10/12/16</a:t>
+              <a:t>11/30/16</a:t>
             </a:fld>
             <a:endParaRPr lang="en-US"/>
           </a:p>
@@ -2973,7 +2973,7 @@
           <a:p>
             <a:fld id="{C99AFE8C-6944-5144-8F3A-80037BCA35A9}" type="datetime1">
               <a:rPr lang="en-US" altLang="zh-CN" smtClean="0"/>
-              <a:t>10/12/16</a:t>
+              <a:t>11/30/16</a:t>
             </a:fld>
             <a:endParaRPr lang="en-US"/>
           </a:p>
@@ -3295,7 +3295,7 @@
           <a:p>
             <a:fld id="{1D11609F-DA99-3146-BAC6-4D542332F32A}" type="datetime1">
               <a:rPr lang="en-US" altLang="zh-CN" smtClean="0"/>
-              <a:t>10/12/16</a:t>
+              <a:t>11/30/16</a:t>
             </a:fld>
             <a:endParaRPr lang="en-US"/>
           </a:p>
@@ -3429,7 +3429,7 @@
           <a:p>
             <a:fld id="{BCDD5045-767B-1A44-BC50-87356E64C7BE}" type="datetime1">
               <a:rPr lang="en-US" altLang="zh-CN" smtClean="0"/>
-              <a:t>10/12/16</a:t>
+              <a:t>11/30/16</a:t>
             </a:fld>
             <a:endParaRPr lang="en-US"/>
           </a:p>
@@ -4210,7 +4210,7 @@
           <a:p>
             <a:fld id="{45D56F2F-E3BA-8040-A304-63E83D4FBA00}" type="datetime1">
               <a:rPr lang="en-US" altLang="zh-CN" smtClean="0"/>
-              <a:t>10/12/16</a:t>
+              <a:t>11/30/16</a:t>
             </a:fld>
             <a:endParaRPr lang="en-US"/>
           </a:p>
@@ -4783,7 +4783,7 @@
   <p:timing>
     <p:tnLst>
       <p:par>
-        <p:cTn xmlns:p14="http://schemas.microsoft.com/office/powerpoint/2010/main" id="1" dur="indefinite" restart="never" nodeType="tmRoot"/>
+        <p:cTn id="1" dur="indefinite" restart="never" nodeType="tmRoot"/>
       </p:par>
     </p:tnLst>
   </p:timing>
@@ -4996,7 +4996,7 @@
   <p:timing>
     <p:tnLst>
       <p:par>
-        <p:cTn xmlns:p14="http://schemas.microsoft.com/office/powerpoint/2010/main" id="1" dur="indefinite" restart="never" nodeType="tmRoot"/>
+        <p:cTn id="1" dur="indefinite" restart="never" nodeType="tmRoot"/>
       </p:par>
     </p:tnLst>
   </p:timing>
@@ -5078,14 +5078,14 @@
           </a:ln>
           <a:extLst>
             <a:ext uri="{909E8E84-426E-40dd-AFC4-6F175D3DCCD1}">
-              <a14:hiddenFill xmlns:a14="http://schemas.microsoft.com/office/drawing/2010/main">
+              <a14:hiddenFill xmlns:a14="http://schemas.microsoft.com/office/drawing/2010/main" xmlns="">
                 <a:solidFill>
                   <a:schemeClr val="accent1"/>
                 </a:solidFill>
               </a14:hiddenFill>
             </a:ext>
             <a:ext uri="{91240B29-F687-4f45-9708-019B960494DF}">
-              <a14:hiddenLine xmlns:a14="http://schemas.microsoft.com/office/drawing/2010/main" w="9525">
+              <a14:hiddenLine xmlns:a14="http://schemas.microsoft.com/office/drawing/2010/main" xmlns="" w="9525">
                 <a:solidFill>
                   <a:schemeClr val="tx1"/>
                 </a:solidFill>
@@ -5312,7 +5312,7 @@
   <p:timing>
     <p:tnLst>
       <p:par>
-        <p:cTn xmlns:p14="http://schemas.microsoft.com/office/powerpoint/2010/main" id="1" dur="indefinite" restart="never" nodeType="tmRoot"/>
+        <p:cTn id="1" dur="indefinite" restart="never" nodeType="tmRoot"/>
       </p:par>
     </p:tnLst>
   </p:timing>
@@ -5391,7 +5391,7 @@
         </p:blipFill>
         <p:spPr bwMode="auto">
           <a:xfrm>
-            <a:off x="152400" y="979658"/>
+            <a:off x="151638" y="864524"/>
             <a:ext cx="8782050" cy="5279684"/>
           </a:xfrm>
           <a:prstGeom prst="rect">
@@ -5403,14 +5403,14 @@
           </a:ln>
           <a:extLst>
             <a:ext uri="{909E8E84-426E-40dd-AFC4-6F175D3DCCD1}">
-              <a14:hiddenFill xmlns:a14="http://schemas.microsoft.com/office/drawing/2010/main">
+              <a14:hiddenFill xmlns:a14="http://schemas.microsoft.com/office/drawing/2010/main" xmlns="">
                 <a:solidFill>
                   <a:schemeClr val="accent1"/>
                 </a:solidFill>
               </a14:hiddenFill>
             </a:ext>
             <a:ext uri="{91240B29-F687-4f45-9708-019B960494DF}">
-              <a14:hiddenLine xmlns:a14="http://schemas.microsoft.com/office/drawing/2010/main" w="9525">
+              <a14:hiddenLine xmlns:a14="http://schemas.microsoft.com/office/drawing/2010/main" xmlns="" w="9525">
                 <a:solidFill>
                   <a:schemeClr val="tx1"/>
                 </a:solidFill>
@@ -5435,7 +5435,7 @@
   <p:timing>
     <p:tnLst>
       <p:par>
-        <p:cTn xmlns:p14="http://schemas.microsoft.com/office/powerpoint/2010/main" id="1" dur="indefinite" restart="never" nodeType="tmRoot"/>
+        <p:cTn id="1" dur="indefinite" restart="never" nodeType="tmRoot"/>
       </p:par>
     </p:tnLst>
   </p:timing>
@@ -5526,14 +5526,14 @@
           </a:ln>
           <a:extLst>
             <a:ext uri="{909E8E84-426E-40dd-AFC4-6F175D3DCCD1}">
-              <a14:hiddenFill xmlns:a14="http://schemas.microsoft.com/office/drawing/2010/main">
+              <a14:hiddenFill xmlns:a14="http://schemas.microsoft.com/office/drawing/2010/main" xmlns="">
                 <a:solidFill>
                   <a:schemeClr val="accent1"/>
                 </a:solidFill>
               </a14:hiddenFill>
             </a:ext>
             <a:ext uri="{91240B29-F687-4f45-9708-019B960494DF}">
-              <a14:hiddenLine xmlns:a14="http://schemas.microsoft.com/office/drawing/2010/main" w="9525">
+              <a14:hiddenLine xmlns:a14="http://schemas.microsoft.com/office/drawing/2010/main" xmlns="" w="9525">
                 <a:solidFill>
                   <a:schemeClr val="tx1"/>
                 </a:solidFill>
@@ -5558,7 +5558,7 @@
   <p:timing>
     <p:tnLst>
       <p:par>
-        <p:cTn xmlns:p14="http://schemas.microsoft.com/office/powerpoint/2010/main" id="1" dur="indefinite" restart="never" nodeType="tmRoot"/>
+        <p:cTn id="1" dur="indefinite" restart="never" nodeType="tmRoot"/>
       </p:par>
     </p:tnLst>
   </p:timing>
@@ -5649,14 +5649,14 @@
           </a:ln>
           <a:extLst>
             <a:ext uri="{909E8E84-426E-40dd-AFC4-6F175D3DCCD1}">
-              <a14:hiddenFill xmlns:a14="http://schemas.microsoft.com/office/drawing/2010/main">
+              <a14:hiddenFill xmlns:a14="http://schemas.microsoft.com/office/drawing/2010/main" xmlns="">
                 <a:solidFill>
                   <a:schemeClr val="accent1"/>
                 </a:solidFill>
               </a14:hiddenFill>
             </a:ext>
             <a:ext uri="{91240B29-F687-4f45-9708-019B960494DF}">
-              <a14:hiddenLine xmlns:a14="http://schemas.microsoft.com/office/drawing/2010/main" w="9525">
+              <a14:hiddenLine xmlns:a14="http://schemas.microsoft.com/office/drawing/2010/main" xmlns="" w="9525">
                 <a:solidFill>
                   <a:schemeClr val="tx1"/>
                 </a:solidFill>
@@ -5681,7 +5681,7 @@
   <p:timing>
     <p:tnLst>
       <p:par>
-        <p:cTn xmlns:p14="http://schemas.microsoft.com/office/powerpoint/2010/main" id="1" dur="indefinite" restart="never" nodeType="tmRoot"/>
+        <p:cTn id="1" dur="indefinite" restart="never" nodeType="tmRoot"/>
       </p:par>
     </p:tnLst>
   </p:timing>
@@ -5780,14 +5780,14 @@
           </a:ln>
           <a:extLst>
             <a:ext uri="{909E8E84-426E-40dd-AFC4-6F175D3DCCD1}">
-              <a14:hiddenFill xmlns:a14="http://schemas.microsoft.com/office/drawing/2010/main">
+              <a14:hiddenFill xmlns:a14="http://schemas.microsoft.com/office/drawing/2010/main" xmlns="">
                 <a:solidFill>
                   <a:schemeClr val="accent1"/>
                 </a:solidFill>
               </a14:hiddenFill>
             </a:ext>
             <a:ext uri="{91240B29-F687-4f45-9708-019B960494DF}">
-              <a14:hiddenLine xmlns:a14="http://schemas.microsoft.com/office/drawing/2010/main" w="9525">
+              <a14:hiddenLine xmlns:a14="http://schemas.microsoft.com/office/drawing/2010/main" xmlns="" w="9525">
                 <a:solidFill>
                   <a:schemeClr val="tx1"/>
                 </a:solidFill>
@@ -5812,7 +5812,7 @@
   <p:timing>
     <p:tnLst>
       <p:par>
-        <p:cTn xmlns:p14="http://schemas.microsoft.com/office/powerpoint/2010/main" id="1" dur="indefinite" restart="never" nodeType="tmRoot"/>
+        <p:cTn id="1" dur="indefinite" restart="never" nodeType="tmRoot"/>
       </p:par>
     </p:tnLst>
   </p:timing>
@@ -5901,14 +5901,14 @@
           </a:ln>
           <a:extLst>
             <a:ext uri="{909E8E84-426E-40dd-AFC4-6F175D3DCCD1}">
-              <a14:hiddenFill xmlns:a14="http://schemas.microsoft.com/office/drawing/2010/main">
+              <a14:hiddenFill xmlns:a14="http://schemas.microsoft.com/office/drawing/2010/main" xmlns="">
                 <a:solidFill>
                   <a:schemeClr val="accent1"/>
                 </a:solidFill>
               </a14:hiddenFill>
             </a:ext>
             <a:ext uri="{91240B29-F687-4f45-9708-019B960494DF}">
-              <a14:hiddenLine xmlns:a14="http://schemas.microsoft.com/office/drawing/2010/main" w="9525">
+              <a14:hiddenLine xmlns:a14="http://schemas.microsoft.com/office/drawing/2010/main" xmlns="" w="9525">
                 <a:solidFill>
                   <a:schemeClr val="tx1"/>
                 </a:solidFill>
@@ -5977,7 +5977,7 @@
   <p:timing>
     <p:tnLst>
       <p:par>
-        <p:cTn xmlns:p14="http://schemas.microsoft.com/office/powerpoint/2010/main" id="1" dur="indefinite" restart="never" nodeType="tmRoot"/>
+        <p:cTn id="1" dur="indefinite" restart="never" nodeType="tmRoot"/>
       </p:par>
     </p:tnLst>
   </p:timing>
@@ -6068,14 +6068,14 @@
           </a:ln>
           <a:extLst>
             <a:ext uri="{909E8E84-426E-40dd-AFC4-6F175D3DCCD1}">
-              <a14:hiddenFill xmlns:a14="http://schemas.microsoft.com/office/drawing/2010/main">
+              <a14:hiddenFill xmlns:a14="http://schemas.microsoft.com/office/drawing/2010/main" xmlns="">
                 <a:solidFill>
                   <a:schemeClr val="accent1"/>
                 </a:solidFill>
               </a14:hiddenFill>
             </a:ext>
             <a:ext uri="{91240B29-F687-4f45-9708-019B960494DF}">
-              <a14:hiddenLine xmlns:a14="http://schemas.microsoft.com/office/drawing/2010/main" w="9525">
+              <a14:hiddenLine xmlns:a14="http://schemas.microsoft.com/office/drawing/2010/main" xmlns="" w="9525">
                 <a:solidFill>
                   <a:schemeClr val="tx1"/>
                 </a:solidFill>
@@ -6100,7 +6100,7 @@
   <p:timing>
     <p:tnLst>
       <p:par>
-        <p:cTn xmlns:p14="http://schemas.microsoft.com/office/powerpoint/2010/main" id="1" dur="indefinite" restart="never" nodeType="tmRoot"/>
+        <p:cTn id="1" dur="indefinite" restart="never" nodeType="tmRoot"/>
       </p:par>
     </p:tnLst>
   </p:timing>
@@ -6469,7 +6469,7 @@
   <p:timing>
     <p:tnLst>
       <p:par>
-        <p:cTn xmlns:p14="http://schemas.microsoft.com/office/powerpoint/2010/main" id="1" dur="indefinite" restart="never" nodeType="tmRoot"/>
+        <p:cTn id="1" dur="indefinite" restart="never" nodeType="tmRoot"/>
       </p:par>
     </p:tnLst>
   </p:timing>
@@ -6560,14 +6560,14 @@
           </a:ln>
           <a:extLst>
             <a:ext uri="{909E8E84-426E-40dd-AFC4-6F175D3DCCD1}">
-              <a14:hiddenFill xmlns:a14="http://schemas.microsoft.com/office/drawing/2010/main">
+              <a14:hiddenFill xmlns:a14="http://schemas.microsoft.com/office/drawing/2010/main" xmlns="">
                 <a:solidFill>
                   <a:schemeClr val="accent1"/>
                 </a:solidFill>
               </a14:hiddenFill>
             </a:ext>
             <a:ext uri="{91240B29-F687-4f45-9708-019B960494DF}">
-              <a14:hiddenLine xmlns:a14="http://schemas.microsoft.com/office/drawing/2010/main" w="9525">
+              <a14:hiddenLine xmlns:a14="http://schemas.microsoft.com/office/drawing/2010/main" xmlns="" w="9525">
                 <a:solidFill>
                   <a:schemeClr val="tx1"/>
                 </a:solidFill>
@@ -6592,7 +6592,7 @@
   <p:timing>
     <p:tnLst>
       <p:par>
-        <p:cTn xmlns:p14="http://schemas.microsoft.com/office/powerpoint/2010/main" id="1" dur="indefinite" restart="never" nodeType="tmRoot"/>
+        <p:cTn id="1" dur="indefinite" restart="never" nodeType="tmRoot"/>
       </p:par>
     </p:tnLst>
   </p:timing>
@@ -6707,7 +6707,7 @@
   <p:timing>
     <p:tnLst>
       <p:par>
-        <p:cTn xmlns:p14="http://schemas.microsoft.com/office/powerpoint/2010/main" id="1" dur="indefinite" restart="never" nodeType="tmRoot"/>
+        <p:cTn id="1" dur="indefinite" restart="never" nodeType="tmRoot"/>
       </p:par>
     </p:tnLst>
   </p:timing>
@@ -6798,14 +6798,14 @@
           </a:ln>
           <a:extLst>
             <a:ext uri="{909E8E84-426E-40dd-AFC4-6F175D3DCCD1}">
-              <a14:hiddenFill xmlns:a14="http://schemas.microsoft.com/office/drawing/2010/main">
+              <a14:hiddenFill xmlns:a14="http://schemas.microsoft.com/office/drawing/2010/main" xmlns="">
                 <a:solidFill>
                   <a:schemeClr val="accent1"/>
                 </a:solidFill>
               </a14:hiddenFill>
             </a:ext>
             <a:ext uri="{91240B29-F687-4f45-9708-019B960494DF}">
-              <a14:hiddenLine xmlns:a14="http://schemas.microsoft.com/office/drawing/2010/main" w="9525">
+              <a14:hiddenLine xmlns:a14="http://schemas.microsoft.com/office/drawing/2010/main" xmlns="" w="9525">
                 <a:solidFill>
                   <a:schemeClr val="tx1"/>
                 </a:solidFill>
@@ -6830,7 +6830,7 @@
   <p:timing>
     <p:tnLst>
       <p:par>
-        <p:cTn xmlns:p14="http://schemas.microsoft.com/office/powerpoint/2010/main" id="1" dur="indefinite" restart="never" nodeType="tmRoot"/>
+        <p:cTn id="1" dur="indefinite" restart="never" nodeType="tmRoot"/>
       </p:par>
     </p:tnLst>
   </p:timing>
@@ -6919,14 +6919,14 @@
           </a:ln>
           <a:extLst>
             <a:ext uri="{909E8E84-426E-40dd-AFC4-6F175D3DCCD1}">
-              <a14:hiddenFill xmlns:a14="http://schemas.microsoft.com/office/drawing/2010/main">
+              <a14:hiddenFill xmlns:a14="http://schemas.microsoft.com/office/drawing/2010/main" xmlns="">
                 <a:solidFill>
                   <a:schemeClr val="accent1"/>
                 </a:solidFill>
               </a14:hiddenFill>
             </a:ext>
             <a:ext uri="{91240B29-F687-4f45-9708-019B960494DF}">
-              <a14:hiddenLine xmlns:a14="http://schemas.microsoft.com/office/drawing/2010/main" w="9525">
+              <a14:hiddenLine xmlns:a14="http://schemas.microsoft.com/office/drawing/2010/main" xmlns="" w="9525">
                 <a:solidFill>
                   <a:schemeClr val="tx1"/>
                 </a:solidFill>
@@ -6987,7 +6987,7 @@
   <p:timing>
     <p:tnLst>
       <p:par>
-        <p:cTn xmlns:p14="http://schemas.microsoft.com/office/powerpoint/2010/main" id="1" dur="indefinite" restart="never" nodeType="tmRoot"/>
+        <p:cTn id="1" dur="indefinite" restart="never" nodeType="tmRoot"/>
       </p:par>
     </p:tnLst>
   </p:timing>
@@ -7078,14 +7078,14 @@
           </a:ln>
           <a:extLst>
             <a:ext uri="{909E8E84-426E-40dd-AFC4-6F175D3DCCD1}">
-              <a14:hiddenFill xmlns:a14="http://schemas.microsoft.com/office/drawing/2010/main">
+              <a14:hiddenFill xmlns:a14="http://schemas.microsoft.com/office/drawing/2010/main" xmlns="">
                 <a:solidFill>
                   <a:schemeClr val="accent1"/>
                 </a:solidFill>
               </a14:hiddenFill>
             </a:ext>
             <a:ext uri="{91240B29-F687-4f45-9708-019B960494DF}">
-              <a14:hiddenLine xmlns:a14="http://schemas.microsoft.com/office/drawing/2010/main" w="9525">
+              <a14:hiddenLine xmlns:a14="http://schemas.microsoft.com/office/drawing/2010/main" xmlns="" w="9525">
                 <a:solidFill>
                   <a:schemeClr val="tx1"/>
                 </a:solidFill>
@@ -7110,7 +7110,7 @@
   <p:timing>
     <p:tnLst>
       <p:par>
-        <p:cTn xmlns:p14="http://schemas.microsoft.com/office/powerpoint/2010/main" id="1" dur="indefinite" restart="never" nodeType="tmRoot"/>
+        <p:cTn id="1" dur="indefinite" restart="never" nodeType="tmRoot"/>
       </p:par>
     </p:tnLst>
   </p:timing>
@@ -7546,7 +7546,7 @@
   <p:timing>
     <p:tnLst>
       <p:par>
-        <p:cTn xmlns:p14="http://schemas.microsoft.com/office/powerpoint/2010/main" id="1" dur="indefinite" restart="never" nodeType="tmRoot"/>
+        <p:cTn id="1" dur="indefinite" restart="never" nodeType="tmRoot"/>
       </p:par>
     </p:tnLst>
   </p:timing>
@@ -7637,14 +7637,14 @@
           </a:ln>
           <a:extLst>
             <a:ext uri="{909E8E84-426E-40dd-AFC4-6F175D3DCCD1}">
-              <a14:hiddenFill xmlns:a14="http://schemas.microsoft.com/office/drawing/2010/main">
+              <a14:hiddenFill xmlns:a14="http://schemas.microsoft.com/office/drawing/2010/main" xmlns="">
                 <a:solidFill>
                   <a:schemeClr val="accent1"/>
                 </a:solidFill>
               </a14:hiddenFill>
             </a:ext>
             <a:ext uri="{91240B29-F687-4f45-9708-019B960494DF}">
-              <a14:hiddenLine xmlns:a14="http://schemas.microsoft.com/office/drawing/2010/main" w="9525">
+              <a14:hiddenLine xmlns:a14="http://schemas.microsoft.com/office/drawing/2010/main" xmlns="" w="9525">
                 <a:solidFill>
                   <a:schemeClr val="tx1"/>
                 </a:solidFill>
@@ -7707,7 +7707,7 @@
   <p:timing>
     <p:tnLst>
       <p:par>
-        <p:cTn xmlns:p14="http://schemas.microsoft.com/office/powerpoint/2010/main" id="1" dur="indefinite" restart="never" nodeType="tmRoot"/>
+        <p:cTn id="1" dur="indefinite" restart="never" nodeType="tmRoot"/>
       </p:par>
     </p:tnLst>
   </p:timing>
@@ -7798,14 +7798,14 @@
           </a:ln>
           <a:extLst>
             <a:ext uri="{909E8E84-426E-40dd-AFC4-6F175D3DCCD1}">
-              <a14:hiddenFill xmlns:a14="http://schemas.microsoft.com/office/drawing/2010/main">
+              <a14:hiddenFill xmlns:a14="http://schemas.microsoft.com/office/drawing/2010/main" xmlns="">
                 <a:solidFill>
                   <a:schemeClr val="accent1"/>
                 </a:solidFill>
               </a14:hiddenFill>
             </a:ext>
             <a:ext uri="{91240B29-F687-4f45-9708-019B960494DF}">
-              <a14:hiddenLine xmlns:a14="http://schemas.microsoft.com/office/drawing/2010/main" w="9525">
+              <a14:hiddenLine xmlns:a14="http://schemas.microsoft.com/office/drawing/2010/main" xmlns="" w="9525">
                 <a:solidFill>
                   <a:schemeClr val="tx1"/>
                 </a:solidFill>
@@ -7830,7 +7830,7 @@
   <p:timing>
     <p:tnLst>
       <p:par>
-        <p:cTn xmlns:p14="http://schemas.microsoft.com/office/powerpoint/2010/main" id="1" dur="indefinite" restart="never" nodeType="tmRoot"/>
+        <p:cTn id="1" dur="indefinite" restart="never" nodeType="tmRoot"/>
       </p:par>
     </p:tnLst>
   </p:timing>
@@ -7919,14 +7919,14 @@
           </a:ln>
           <a:extLst>
             <a:ext uri="{909E8E84-426E-40dd-AFC4-6F175D3DCCD1}">
-              <a14:hiddenFill xmlns:a14="http://schemas.microsoft.com/office/drawing/2010/main">
+              <a14:hiddenFill xmlns:a14="http://schemas.microsoft.com/office/drawing/2010/main" xmlns="">
                 <a:solidFill>
                   <a:schemeClr val="accent1"/>
                 </a:solidFill>
               </a14:hiddenFill>
             </a:ext>
             <a:ext uri="{91240B29-F687-4f45-9708-019B960494DF}">
-              <a14:hiddenLine xmlns:a14="http://schemas.microsoft.com/office/drawing/2010/main" w="9525">
+              <a14:hiddenLine xmlns:a14="http://schemas.microsoft.com/office/drawing/2010/main" xmlns="" w="9525">
                 <a:solidFill>
                   <a:schemeClr val="tx1"/>
                 </a:solidFill>
@@ -7995,7 +7995,7 @@
   <p:timing>
     <p:tnLst>
       <p:par>
-        <p:cTn xmlns:p14="http://schemas.microsoft.com/office/powerpoint/2010/main" id="1" dur="indefinite" restart="never" nodeType="tmRoot"/>
+        <p:cTn id="1" dur="indefinite" restart="never" nodeType="tmRoot"/>
       </p:par>
     </p:tnLst>
   </p:timing>
@@ -8086,14 +8086,14 @@
           </a:ln>
           <a:extLst>
             <a:ext uri="{909E8E84-426E-40dd-AFC4-6F175D3DCCD1}">
-              <a14:hiddenFill xmlns:a14="http://schemas.microsoft.com/office/drawing/2010/main">
+              <a14:hiddenFill xmlns:a14="http://schemas.microsoft.com/office/drawing/2010/main" xmlns="">
                 <a:solidFill>
                   <a:schemeClr val="accent1"/>
                 </a:solidFill>
               </a14:hiddenFill>
             </a:ext>
             <a:ext uri="{91240B29-F687-4f45-9708-019B960494DF}">
-              <a14:hiddenLine xmlns:a14="http://schemas.microsoft.com/office/drawing/2010/main" w="9525">
+              <a14:hiddenLine xmlns:a14="http://schemas.microsoft.com/office/drawing/2010/main" xmlns="" w="9525">
                 <a:solidFill>
                   <a:schemeClr val="tx1"/>
                 </a:solidFill>
@@ -8118,7 +8118,7 @@
   <p:timing>
     <p:tnLst>
       <p:par>
-        <p:cTn xmlns:p14="http://schemas.microsoft.com/office/powerpoint/2010/main" id="1" dur="indefinite" restart="never" nodeType="tmRoot"/>
+        <p:cTn id="1" dur="indefinite" restart="never" nodeType="tmRoot"/>
       </p:par>
     </p:tnLst>
   </p:timing>
@@ -8223,7 +8223,7 @@
   <p:timing>
     <p:tnLst>
       <p:par>
-        <p:cTn xmlns:p14="http://schemas.microsoft.com/office/powerpoint/2010/main" id="1" dur="indefinite" restart="never" nodeType="tmRoot"/>
+        <p:cTn id="1" dur="indefinite" restart="never" nodeType="tmRoot"/>
       </p:par>
     </p:tnLst>
   </p:timing>
@@ -8372,7 +8372,7 @@
   <p:timing>
     <p:tnLst>
       <p:par>
-        <p:cTn xmlns:p14="http://schemas.microsoft.com/office/powerpoint/2010/main" id="1" dur="indefinite" restart="never" nodeType="tmRoot"/>
+        <p:cTn id="1" dur="indefinite" restart="never" nodeType="tmRoot"/>
       </p:par>
     </p:tnLst>
   </p:timing>
@@ -8845,7 +8845,7 @@
           <a:noFill/>
           <a:extLst>
             <a:ext uri="{909E8E84-426E-40dd-AFC4-6F175D3DCCD1}">
-              <a14:hiddenFill xmlns:a14="http://schemas.microsoft.com/office/drawing/2010/main">
+              <a14:hiddenFill xmlns:a14="http://schemas.microsoft.com/office/drawing/2010/main" xmlns="">
                 <a:solidFill>
                   <a:srgbClr val="FFFFFF"/>
                 </a:solidFill>
@@ -8912,7 +8912,7 @@
   <p:timing>
     <p:tnLst>
       <p:par>
-        <p:cTn xmlns:p14="http://schemas.microsoft.com/office/powerpoint/2010/main" id="1" dur="indefinite" restart="never" nodeType="tmRoot"/>
+        <p:cTn id="1" dur="indefinite" restart="never" nodeType="tmRoot"/>
       </p:par>
     </p:tnLst>
   </p:timing>
@@ -9003,14 +9003,14 @@
           </a:ln>
           <a:extLst>
             <a:ext uri="{909E8E84-426E-40dd-AFC4-6F175D3DCCD1}">
-              <a14:hiddenFill xmlns:a14="http://schemas.microsoft.com/office/drawing/2010/main">
+              <a14:hiddenFill xmlns:a14="http://schemas.microsoft.com/office/drawing/2010/main" xmlns="">
                 <a:solidFill>
                   <a:schemeClr val="accent1"/>
                 </a:solidFill>
               </a14:hiddenFill>
             </a:ext>
             <a:ext uri="{91240B29-F687-4f45-9708-019B960494DF}">
-              <a14:hiddenLine xmlns:a14="http://schemas.microsoft.com/office/drawing/2010/main" w="9525">
+              <a14:hiddenLine xmlns:a14="http://schemas.microsoft.com/office/drawing/2010/main" xmlns="" w="9525">
                 <a:solidFill>
                   <a:schemeClr val="tx1"/>
                 </a:solidFill>
@@ -9035,7 +9035,7 @@
   <p:timing>
     <p:tnLst>
       <p:par>
-        <p:cTn xmlns:p14="http://schemas.microsoft.com/office/powerpoint/2010/main" id="1" dur="indefinite" restart="never" nodeType="tmRoot"/>
+        <p:cTn id="1" dur="indefinite" restart="never" nodeType="tmRoot"/>
       </p:par>
     </p:tnLst>
   </p:timing>
@@ -9126,14 +9126,14 @@
           </a:ln>
           <a:extLst>
             <a:ext uri="{909E8E84-426E-40dd-AFC4-6F175D3DCCD1}">
-              <a14:hiddenFill xmlns:a14="http://schemas.microsoft.com/office/drawing/2010/main">
+              <a14:hiddenFill xmlns:a14="http://schemas.microsoft.com/office/drawing/2010/main" xmlns="">
                 <a:solidFill>
                   <a:schemeClr val="accent1"/>
                 </a:solidFill>
               </a14:hiddenFill>
             </a:ext>
             <a:ext uri="{91240B29-F687-4f45-9708-019B960494DF}">
-              <a14:hiddenLine xmlns:a14="http://schemas.microsoft.com/office/drawing/2010/main" w="9525">
+              <a14:hiddenLine xmlns:a14="http://schemas.microsoft.com/office/drawing/2010/main" xmlns="" w="9525">
                 <a:solidFill>
                   <a:schemeClr val="tx1"/>
                 </a:solidFill>
@@ -9158,7 +9158,7 @@
   <p:timing>
     <p:tnLst>
       <p:par>
-        <p:cTn xmlns:p14="http://schemas.microsoft.com/office/powerpoint/2010/main" id="1" dur="indefinite" restart="never" nodeType="tmRoot"/>
+        <p:cTn id="1" dur="indefinite" restart="never" nodeType="tmRoot"/>
       </p:par>
     </p:tnLst>
   </p:timing>
@@ -9247,14 +9247,14 @@
           </a:ln>
           <a:extLst>
             <a:ext uri="{909E8E84-426E-40dd-AFC4-6F175D3DCCD1}">
-              <a14:hiddenFill xmlns:a14="http://schemas.microsoft.com/office/drawing/2010/main">
+              <a14:hiddenFill xmlns:a14="http://schemas.microsoft.com/office/drawing/2010/main" xmlns="">
                 <a:solidFill>
                   <a:schemeClr val="accent1"/>
                 </a:solidFill>
               </a14:hiddenFill>
             </a:ext>
             <a:ext uri="{91240B29-F687-4f45-9708-019B960494DF}">
-              <a14:hiddenLine xmlns:a14="http://schemas.microsoft.com/office/drawing/2010/main" w="9525">
+              <a14:hiddenLine xmlns:a14="http://schemas.microsoft.com/office/drawing/2010/main" xmlns="" w="9525">
                 <a:solidFill>
                   <a:schemeClr val="tx1"/>
                 </a:solidFill>
@@ -9315,7 +9315,7 @@
   <p:timing>
     <p:tnLst>
       <p:par>
-        <p:cTn xmlns:p14="http://schemas.microsoft.com/office/powerpoint/2010/main" id="1" dur="indefinite" restart="never" nodeType="tmRoot"/>
+        <p:cTn id="1" dur="indefinite" restart="never" nodeType="tmRoot"/>
       </p:par>
     </p:tnLst>
   </p:timing>
@@ -9406,14 +9406,14 @@
           </a:ln>
           <a:extLst>
             <a:ext uri="{909E8E84-426E-40dd-AFC4-6F175D3DCCD1}">
-              <a14:hiddenFill xmlns:a14="http://schemas.microsoft.com/office/drawing/2010/main">
+              <a14:hiddenFill xmlns:a14="http://schemas.microsoft.com/office/drawing/2010/main" xmlns="">
                 <a:solidFill>
                   <a:schemeClr val="accent1"/>
                 </a:solidFill>
               </a14:hiddenFill>
             </a:ext>
             <a:ext uri="{91240B29-F687-4f45-9708-019B960494DF}">
-              <a14:hiddenLine xmlns:a14="http://schemas.microsoft.com/office/drawing/2010/main" w="9525">
+              <a14:hiddenLine xmlns:a14="http://schemas.microsoft.com/office/drawing/2010/main" xmlns="" w="9525">
                 <a:solidFill>
                   <a:schemeClr val="tx1"/>
                 </a:solidFill>
@@ -9438,7 +9438,7 @@
   <p:timing>
     <p:tnLst>
       <p:par>
-        <p:cTn xmlns:p14="http://schemas.microsoft.com/office/powerpoint/2010/main" id="1" dur="indefinite" restart="never" nodeType="tmRoot"/>
+        <p:cTn id="1" dur="indefinite" restart="never" nodeType="tmRoot"/>
       </p:par>
     </p:tnLst>
   </p:timing>
@@ -9575,7 +9575,7 @@
             </a:ln>
             <a:extLst>
               <a:ext uri="{909E8E84-426E-40dd-AFC4-6F175D3DCCD1}">
-                <a14:hiddenFill xmlns:a14="http://schemas.microsoft.com/office/drawing/2010/main">
+                <a14:hiddenFill xmlns:a14="http://schemas.microsoft.com/office/drawing/2010/main" xmlns="">
                   <a:noFill/>
                 </a14:hiddenFill>
               </a:ext>
@@ -9616,7 +9616,7 @@
             </a:ln>
             <a:extLst>
               <a:ext uri="{909E8E84-426E-40dd-AFC4-6F175D3DCCD1}">
-                <a14:hiddenFill xmlns:a14="http://schemas.microsoft.com/office/drawing/2010/main">
+                <a14:hiddenFill xmlns:a14="http://schemas.microsoft.com/office/drawing/2010/main" xmlns="">
                   <a:noFill/>
                 </a14:hiddenFill>
               </a:ext>
@@ -9657,7 +9657,7 @@
             </a:ln>
             <a:extLst>
               <a:ext uri="{909E8E84-426E-40dd-AFC4-6F175D3DCCD1}">
-                <a14:hiddenFill xmlns:a14="http://schemas.microsoft.com/office/drawing/2010/main">
+                <a14:hiddenFill xmlns:a14="http://schemas.microsoft.com/office/drawing/2010/main" xmlns="">
                   <a:noFill/>
                 </a14:hiddenFill>
               </a:ext>
@@ -9698,7 +9698,7 @@
             </a:ln>
             <a:extLst>
               <a:ext uri="{909E8E84-426E-40dd-AFC4-6F175D3DCCD1}">
-                <a14:hiddenFill xmlns:a14="http://schemas.microsoft.com/office/drawing/2010/main">
+                <a14:hiddenFill xmlns:a14="http://schemas.microsoft.com/office/drawing/2010/main" xmlns="">
                   <a:noFill/>
                 </a14:hiddenFill>
               </a:ext>
@@ -9739,7 +9739,7 @@
             </a:ln>
             <a:extLst>
               <a:ext uri="{909E8E84-426E-40dd-AFC4-6F175D3DCCD1}">
-                <a14:hiddenFill xmlns:a14="http://schemas.microsoft.com/office/drawing/2010/main">
+                <a14:hiddenFill xmlns:a14="http://schemas.microsoft.com/office/drawing/2010/main" xmlns="">
                   <a:noFill/>
                 </a14:hiddenFill>
               </a:ext>
@@ -9780,7 +9780,7 @@
             </a:ln>
             <a:extLst>
               <a:ext uri="{909E8E84-426E-40dd-AFC4-6F175D3DCCD1}">
-                <a14:hiddenFill xmlns:a14="http://schemas.microsoft.com/office/drawing/2010/main">
+                <a14:hiddenFill xmlns:a14="http://schemas.microsoft.com/office/drawing/2010/main" xmlns="">
                   <a:noFill/>
                 </a14:hiddenFill>
               </a:ext>
@@ -9821,7 +9821,7 @@
             </a:ln>
             <a:extLst>
               <a:ext uri="{909E8E84-426E-40dd-AFC4-6F175D3DCCD1}">
-                <a14:hiddenFill xmlns:a14="http://schemas.microsoft.com/office/drawing/2010/main">
+                <a14:hiddenFill xmlns:a14="http://schemas.microsoft.com/office/drawing/2010/main" xmlns="">
                   <a:noFill/>
                 </a14:hiddenFill>
               </a:ext>
@@ -9862,7 +9862,7 @@
             </a:ln>
             <a:extLst>
               <a:ext uri="{909E8E84-426E-40dd-AFC4-6F175D3DCCD1}">
-                <a14:hiddenFill xmlns:a14="http://schemas.microsoft.com/office/drawing/2010/main">
+                <a14:hiddenFill xmlns:a14="http://schemas.microsoft.com/office/drawing/2010/main" xmlns="">
                   <a:noFill/>
                 </a14:hiddenFill>
               </a:ext>
@@ -9903,7 +9903,7 @@
             </a:ln>
             <a:extLst>
               <a:ext uri="{909E8E84-426E-40dd-AFC4-6F175D3DCCD1}">
-                <a14:hiddenFill xmlns:a14="http://schemas.microsoft.com/office/drawing/2010/main">
+                <a14:hiddenFill xmlns:a14="http://schemas.microsoft.com/office/drawing/2010/main" xmlns="">
                   <a:noFill/>
                 </a14:hiddenFill>
               </a:ext>
@@ -9939,14 +9939,14 @@
             </a:ln>
             <a:extLst>
               <a:ext uri="{909E8E84-426E-40dd-AFC4-6F175D3DCCD1}">
-                <a14:hiddenFill xmlns:a14="http://schemas.microsoft.com/office/drawing/2010/main">
+                <a14:hiddenFill xmlns:a14="http://schemas.microsoft.com/office/drawing/2010/main" xmlns="">
                   <a:solidFill>
                     <a:srgbClr val="FFFFFF"/>
                   </a:solidFill>
                 </a14:hiddenFill>
               </a:ext>
               <a:ext uri="{91240B29-F687-4f45-9708-019B960494DF}">
-                <a14:hiddenLine xmlns:a14="http://schemas.microsoft.com/office/drawing/2010/main" w="9525">
+                <a14:hiddenLine xmlns:a14="http://schemas.microsoft.com/office/drawing/2010/main" xmlns="" w="9525">
                   <a:solidFill>
                     <a:srgbClr val="000000"/>
                   </a:solidFill>
@@ -10094,14 +10094,14 @@
             </a:ln>
             <a:extLst>
               <a:ext uri="{909E8E84-426E-40dd-AFC4-6F175D3DCCD1}">
-                <a14:hiddenFill xmlns:a14="http://schemas.microsoft.com/office/drawing/2010/main">
+                <a14:hiddenFill xmlns:a14="http://schemas.microsoft.com/office/drawing/2010/main" xmlns="">
                   <a:solidFill>
                     <a:srgbClr val="FFFFFF"/>
                   </a:solidFill>
                 </a14:hiddenFill>
               </a:ext>
               <a:ext uri="{91240B29-F687-4f45-9708-019B960494DF}">
-                <a14:hiddenLine xmlns:a14="http://schemas.microsoft.com/office/drawing/2010/main" w="9525">
+                <a14:hiddenLine xmlns:a14="http://schemas.microsoft.com/office/drawing/2010/main" xmlns="" w="9525">
                   <a:solidFill>
                     <a:srgbClr val="000000"/>
                   </a:solidFill>
@@ -10249,14 +10249,14 @@
             </a:ln>
             <a:extLst>
               <a:ext uri="{909E8E84-426E-40dd-AFC4-6F175D3DCCD1}">
-                <a14:hiddenFill xmlns:a14="http://schemas.microsoft.com/office/drawing/2010/main">
+                <a14:hiddenFill xmlns:a14="http://schemas.microsoft.com/office/drawing/2010/main" xmlns="">
                   <a:solidFill>
                     <a:srgbClr val="FFFFFF"/>
                   </a:solidFill>
                 </a14:hiddenFill>
               </a:ext>
               <a:ext uri="{91240B29-F687-4f45-9708-019B960494DF}">
-                <a14:hiddenLine xmlns:a14="http://schemas.microsoft.com/office/drawing/2010/main" w="9525">
+                <a14:hiddenLine xmlns:a14="http://schemas.microsoft.com/office/drawing/2010/main" xmlns="" w="9525">
                   <a:solidFill>
                     <a:srgbClr val="000000"/>
                   </a:solidFill>
@@ -10396,7 +10396,7 @@
   <p:timing>
     <p:tnLst>
       <p:par>
-        <p:cTn xmlns:p14="http://schemas.microsoft.com/office/powerpoint/2010/main" id="1" dur="indefinite" restart="never" nodeType="tmRoot"/>
+        <p:cTn id="1" dur="indefinite" restart="never" nodeType="tmRoot"/>
       </p:par>
     </p:tnLst>
   </p:timing>

</xml_diff>